<commit_message>
small change in pptx
</commit_message>
<xml_diff>
--- a/Progress_update_1.pptx
+++ b/Progress_update_1.pptx
@@ -3961,7 +3961,7 @@
                 <a:cs typeface="+mn-cs"/>
               </a:defRPr>
             </a:pPr>
-            <a:endParaRPr lang="en-US"/>
+            <a:endParaRPr lang="nl-NL"/>
           </a:p>
         </c:txPr>
         <c:crossAx val="466087880"/>
@@ -4020,7 +4020,7 @@
                 <a:cs typeface="+mn-cs"/>
               </a:defRPr>
             </a:pPr>
-            <a:endParaRPr lang="en-US"/>
+            <a:endParaRPr lang="nl-NL"/>
           </a:p>
         </c:txPr>
         <c:crossAx val="466088208"/>
@@ -4053,7 +4053,7 @@
       <a:pPr>
         <a:defRPr/>
       </a:pPr>
-      <a:endParaRPr lang="en-US"/>
+      <a:endParaRPr lang="nl-NL"/>
     </a:p>
   </c:txPr>
   <c:externalData r:id="rId3">
@@ -7464,7 +7464,12 @@
             <p:ph type="ctrTitle"/>
           </p:nvPr>
         </p:nvSpPr>
-        <p:spPr/>
+        <p:spPr>
+          <a:xfrm>
+            <a:off x="1431721" y="0"/>
+            <a:ext cx="9144000" cy="2387600"/>
+          </a:xfrm>
+        </p:spPr>
         <p:txBody>
           <a:bodyPr/>
           <a:lstStyle/>
@@ -7504,7 +7509,11 @@
           <a:p>
             <a:r>
               <a:rPr lang="nl-NL" dirty="0"/>
-              <a:t>Group –</a:t>
+              <a:t>Group </a:t>
+            </a:r>
+            <a:r>
+              <a:rPr lang="nl-NL" u="sng" dirty="0"/>
+              <a:t>DSTR</a:t>
             </a:r>
           </a:p>
           <a:p>
@@ -7598,25 +7607,254 @@
         </p:nvSpPr>
         <p:spPr/>
         <p:txBody>
-          <a:bodyPr/>
+          <a:bodyPr>
+            <a:normAutofit/>
+          </a:bodyPr>
           <a:lstStyle/>
           <a:p>
             <a:r>
-              <a:rPr lang="nl-NL" dirty="0">
-                <a:hlinkClick r:id="rId2"/>
-              </a:rPr>
-              <a:t>https://nestor.rug.nl/courses/1/INMCV-08.2016-2017.2A/content/_7876615_1/IEEE_SPM_2009_Salembier_Wilkinson.pdf</a:t>
-            </a:r>
-            <a:endParaRPr lang="nl-NL" dirty="0"/>
-          </a:p>
-          <a:p>
-            <a:endParaRPr lang="nl-NL" dirty="0"/>
+              <a:rPr lang="en-US" sz="1600" b="1" dirty="0"/>
+              <a:t>Connected Operators: A review of region-based morphological image processing techniques, </a:t>
+            </a:r>
+            <a:r>
+              <a:rPr lang="en-US" sz="1600" dirty="0" err="1"/>
+              <a:t>Salembier</a:t>
+            </a:r>
+            <a:r>
+              <a:rPr lang="en-US" sz="1600" dirty="0"/>
+              <a:t>, P. &amp; Wilkinson, M. H. F. </a:t>
+            </a:r>
+            <a:r>
+              <a:rPr lang="en-US" sz="1600" i="1" dirty="0"/>
+              <a:t>IEEE Signal Processing Magazine </a:t>
+            </a:r>
+            <a:r>
+              <a:rPr lang="en-US" sz="1600" dirty="0"/>
+              <a:t>26(6), 136-157, Nov-2009</a:t>
+            </a:r>
+            <a:endParaRPr lang="nl-NL" sz="1600" dirty="0"/>
+          </a:p>
+          <a:p>
+            <a:r>
+              <a:rPr lang="nl-NL" sz="1600" b="1" dirty="0"/>
+              <a:t>A </a:t>
+            </a:r>
+            <a:r>
+              <a:rPr lang="nl-NL" sz="1600" b="1" dirty="0" err="1"/>
+              <a:t>Handwritten</a:t>
+            </a:r>
+            <a:r>
+              <a:rPr lang="nl-NL" sz="1600" b="1" dirty="0"/>
+              <a:t> </a:t>
+            </a:r>
+            <a:r>
+              <a:rPr lang="nl-NL" sz="1600" b="1" dirty="0" err="1"/>
+              <a:t>Character</a:t>
+            </a:r>
+            <a:r>
+              <a:rPr lang="nl-NL" sz="1600" b="1" dirty="0"/>
+              <a:t> </a:t>
+            </a:r>
+            <a:r>
+              <a:rPr lang="nl-NL" sz="1600" b="1" dirty="0" err="1"/>
+              <a:t>Recognition</a:t>
+            </a:r>
+            <a:r>
+              <a:rPr lang="nl-NL" sz="1600" b="1" dirty="0"/>
+              <a:t> System Using </a:t>
+            </a:r>
+            <a:r>
+              <a:rPr lang="nl-NL" sz="1600" b="1" dirty="0" err="1"/>
+              <a:t>Directional</a:t>
+            </a:r>
+            <a:r>
+              <a:rPr lang="nl-NL" sz="1600" b="1" dirty="0"/>
+              <a:t> Element Feature </a:t>
+            </a:r>
+            <a:r>
+              <a:rPr lang="nl-NL" sz="1600" b="1" dirty="0" err="1"/>
+              <a:t>and</a:t>
+            </a:r>
+            <a:r>
+              <a:rPr lang="nl-NL" sz="1600" b="1" dirty="0"/>
+              <a:t> </a:t>
+            </a:r>
+            <a:r>
+              <a:rPr lang="nl-NL" sz="1600" b="1" dirty="0" err="1"/>
+              <a:t>Asymmetric</a:t>
+            </a:r>
+            <a:r>
+              <a:rPr lang="nl-NL" sz="1600" b="1" dirty="0"/>
+              <a:t> </a:t>
+            </a:r>
+            <a:r>
+              <a:rPr lang="nl-NL" sz="1600" b="1" dirty="0" err="1"/>
+              <a:t>Mahalanobis</a:t>
+            </a:r>
+            <a:r>
+              <a:rPr lang="nl-NL" sz="1600" b="1" dirty="0"/>
+              <a:t> </a:t>
+            </a:r>
+            <a:r>
+              <a:rPr lang="nl-NL" sz="1600" b="1" dirty="0" err="1"/>
+              <a:t>Distance</a:t>
+            </a:r>
+            <a:r>
+              <a:rPr lang="nl-NL" sz="1600" dirty="0"/>
+              <a:t>, Kate, N. </a:t>
+            </a:r>
+            <a:r>
+              <a:rPr lang="nl-NL" sz="1600" i="1" dirty="0"/>
+              <a:t>et al.</a:t>
+            </a:r>
+            <a:r>
+              <a:rPr lang="nl-NL" sz="1600" dirty="0"/>
+              <a:t> </a:t>
+            </a:r>
+            <a:r>
+              <a:rPr lang="nl-NL" sz="1600" i="1" dirty="0"/>
+              <a:t>IEEE Transactions on </a:t>
+            </a:r>
+            <a:r>
+              <a:rPr lang="nl-NL" sz="1600" i="1" dirty="0" err="1"/>
+              <a:t>Pattern</a:t>
+            </a:r>
+            <a:r>
+              <a:rPr lang="nl-NL" sz="1600" i="1" dirty="0"/>
+              <a:t> Analysis </a:t>
+            </a:r>
+            <a:r>
+              <a:rPr lang="nl-NL" sz="1600" i="1" dirty="0" err="1"/>
+              <a:t>and</a:t>
+            </a:r>
+            <a:r>
+              <a:rPr lang="nl-NL" sz="1600" i="1" dirty="0"/>
+              <a:t> Machine Intelligence </a:t>
+            </a:r>
+            <a:r>
+              <a:rPr lang="nl-NL" sz="1600" dirty="0"/>
+              <a:t>21(3): 258-262, Mar-1999</a:t>
+            </a:r>
+          </a:p>
+          <a:p>
+            <a:r>
+              <a:rPr lang="nl-NL" sz="1600" b="1" dirty="0"/>
+              <a:t>Research on Feature </a:t>
+            </a:r>
+            <a:r>
+              <a:rPr lang="nl-NL" sz="1600" b="1" dirty="0" err="1"/>
+              <a:t>Extraction</a:t>
+            </a:r>
+            <a:r>
+              <a:rPr lang="nl-NL" sz="1600" b="1" dirty="0"/>
+              <a:t> Method </a:t>
+            </a:r>
+            <a:r>
+              <a:rPr lang="nl-NL" sz="1600" b="1" dirty="0" err="1"/>
+              <a:t>for</a:t>
+            </a:r>
+            <a:r>
+              <a:rPr lang="nl-NL" sz="1600" b="1" dirty="0"/>
+              <a:t> </a:t>
+            </a:r>
+            <a:r>
+              <a:rPr lang="nl-NL" sz="1600" b="1" dirty="0" err="1"/>
+              <a:t>Handwritten</a:t>
+            </a:r>
+            <a:r>
+              <a:rPr lang="nl-NL" sz="1600" b="1" dirty="0"/>
+              <a:t> Chinese </a:t>
+            </a:r>
+            <a:r>
+              <a:rPr lang="nl-NL" sz="1600" b="1" dirty="0" err="1"/>
+              <a:t>Character</a:t>
+            </a:r>
+            <a:r>
+              <a:rPr lang="nl-NL" sz="1600" b="1" dirty="0"/>
+              <a:t> </a:t>
+            </a:r>
+            <a:r>
+              <a:rPr lang="nl-NL" sz="1600" b="1" dirty="0" err="1"/>
+              <a:t>Recognition</a:t>
+            </a:r>
+            <a:r>
+              <a:rPr lang="nl-NL" sz="1600" b="1" dirty="0"/>
+              <a:t> </a:t>
+            </a:r>
+            <a:r>
+              <a:rPr lang="nl-NL" sz="1600" b="1" dirty="0" err="1"/>
+              <a:t>Based</a:t>
+            </a:r>
+            <a:r>
+              <a:rPr lang="nl-NL" sz="1600" b="1" dirty="0"/>
+              <a:t> on </a:t>
+            </a:r>
+            <a:r>
+              <a:rPr lang="nl-NL" sz="1600" b="1" dirty="0" err="1"/>
+              <a:t>Kernel</a:t>
+            </a:r>
+            <a:r>
+              <a:rPr lang="nl-NL" sz="1600" b="1" dirty="0"/>
+              <a:t> Independent Component Analysis</a:t>
+            </a:r>
+            <a:r>
+              <a:rPr lang="nl-NL" sz="1600" b="1" i="1" dirty="0"/>
+              <a:t>, </a:t>
+            </a:r>
+            <a:r>
+              <a:rPr lang="nl-NL" sz="1600" dirty="0" err="1"/>
+              <a:t>Zhiguo</a:t>
+            </a:r>
+            <a:r>
+              <a:rPr lang="nl-NL" sz="1600" dirty="0"/>
+              <a:t>, H. &amp; </a:t>
+            </a:r>
+            <a:r>
+              <a:rPr lang="nl-NL" sz="1600" dirty="0" err="1"/>
+              <a:t>Xiaoli</a:t>
+            </a:r>
+            <a:r>
+              <a:rPr lang="nl-NL" sz="1600" dirty="0"/>
+              <a:t>, Y. </a:t>
+            </a:r>
+            <a:r>
+              <a:rPr lang="nl-NL" sz="1600" i="1" dirty="0"/>
+              <a:t>Research </a:t>
+            </a:r>
+            <a:r>
+              <a:rPr lang="nl-NL" sz="1600" i="1" dirty="0" err="1"/>
+              <a:t>journal</a:t>
+            </a:r>
+            <a:r>
+              <a:rPr lang="nl-NL" sz="1600" i="1" dirty="0"/>
+              <a:t> of </a:t>
+            </a:r>
+            <a:r>
+              <a:rPr lang="nl-NL" sz="1600" i="1" dirty="0" err="1"/>
+              <a:t>Applied</a:t>
+            </a:r>
+            <a:r>
+              <a:rPr lang="nl-NL" sz="1600" i="1" dirty="0"/>
+              <a:t> Sciences, Engineering </a:t>
+            </a:r>
+            <a:r>
+              <a:rPr lang="nl-NL" sz="1600" i="1" dirty="0" err="1"/>
+              <a:t>and</a:t>
+            </a:r>
+            <a:r>
+              <a:rPr lang="nl-NL" sz="1600" i="1" dirty="0"/>
+              <a:t> Technology 6(7): 1283-1287, 2013</a:t>
+            </a:r>
+            <a:endParaRPr lang="nl-NL" sz="1600" dirty="0"/>
+          </a:p>
+          <a:p>
+            <a:endParaRPr lang="nl-NL" sz="1600" dirty="0"/>
           </a:p>
           <a:p>
             <a:pPr marL="0" indent="0">
               <a:buNone/>
             </a:pPr>
-            <a:endParaRPr lang="nl-NL" dirty="0"/>
+            <a:endParaRPr lang="nl-NL" sz="1600" dirty="0"/>
           </a:p>
         </p:txBody>
       </p:sp>
@@ -7866,7 +8104,15 @@
             </a:r>
             <a:r>
               <a:rPr lang="nl-NL" dirty="0"/>
-              <a:t> tokens </a:t>
+              <a:t> </a:t>
+            </a:r>
+            <a:r>
+              <a:rPr lang="nl-NL" dirty="0" err="1"/>
+              <a:t>characters</a:t>
+            </a:r>
+            <a:r>
+              <a:rPr lang="nl-NL" dirty="0"/>
+              <a:t> </a:t>
             </a:r>
             <a:r>
               <a:rPr lang="nl-NL" dirty="0" err="1"/>
@@ -8346,7 +8592,75 @@
           <a:bodyPr/>
           <a:lstStyle/>
           <a:p>
-            <a:endParaRPr lang="nl-NL"/>
+            <a:r>
+              <a:rPr lang="nl-NL" dirty="0" err="1"/>
+              <a:t>Ongoing</a:t>
+            </a:r>
+            <a:r>
+              <a:rPr lang="nl-NL" dirty="0"/>
+              <a:t> </a:t>
+            </a:r>
+            <a:r>
+              <a:rPr lang="nl-NL" dirty="0" err="1"/>
+              <a:t>process</a:t>
+            </a:r>
+            <a:r>
+              <a:rPr lang="nl-NL" dirty="0"/>
+              <a:t>: </a:t>
+            </a:r>
+            <a:r>
+              <a:rPr lang="nl-NL" dirty="0" err="1"/>
+              <a:t>Threshold</a:t>
+            </a:r>
+            <a:r>
+              <a:rPr lang="nl-NL" dirty="0"/>
+              <a:t> </a:t>
+            </a:r>
+            <a:r>
+              <a:rPr lang="nl-NL" dirty="0" err="1"/>
+              <a:t>optimization</a:t>
+            </a:r>
+            <a:r>
+              <a:rPr lang="nl-NL" dirty="0"/>
+              <a:t> </a:t>
+            </a:r>
+            <a:r>
+              <a:rPr lang="nl-NL" dirty="0" err="1"/>
+              <a:t>for</a:t>
+            </a:r>
+            <a:r>
+              <a:rPr lang="nl-NL" dirty="0"/>
+              <a:t> </a:t>
+            </a:r>
+            <a:r>
+              <a:rPr lang="nl-NL" dirty="0" err="1"/>
+              <a:t>binarization</a:t>
+            </a:r>
+            <a:r>
+              <a:rPr lang="nl-NL" dirty="0"/>
+              <a:t> </a:t>
+            </a:r>
+            <a:r>
+              <a:rPr lang="nl-NL" dirty="0" err="1"/>
+              <a:t>and</a:t>
+            </a:r>
+            <a:r>
+              <a:rPr lang="nl-NL" dirty="0"/>
+              <a:t> </a:t>
+            </a:r>
+            <a:r>
+              <a:rPr lang="nl-NL" dirty="0" err="1"/>
+              <a:t>noise</a:t>
+            </a:r>
+            <a:r>
+              <a:rPr lang="nl-NL" dirty="0"/>
+              <a:t> </a:t>
+            </a:r>
+            <a:r>
+              <a:rPr lang="nl-NL" dirty="0" err="1"/>
+              <a:t>removal</a:t>
+            </a:r>
+            <a:endParaRPr lang="nl-NL" dirty="0"/>
           </a:p>
         </p:txBody>
       </p:sp>
@@ -8430,7 +8744,77 @@
           <a:bodyPr/>
           <a:lstStyle/>
           <a:p>
-            <a:endParaRPr lang="nl-NL"/>
+            <a:r>
+              <a:rPr lang="nl-NL" dirty="0"/>
+              <a:t>First preprocessing </a:t>
+            </a:r>
+            <a:r>
+              <a:rPr lang="nl-NL" dirty="0" err="1"/>
+              <a:t>done</a:t>
+            </a:r>
+            <a:r>
+              <a:rPr lang="nl-NL" dirty="0"/>
+              <a:t> – </a:t>
+            </a:r>
+            <a:r>
+              <a:rPr lang="nl-NL" dirty="0" err="1"/>
+              <a:t>needs</a:t>
+            </a:r>
+            <a:r>
+              <a:rPr lang="nl-NL" dirty="0"/>
+              <a:t> </a:t>
+            </a:r>
+            <a:r>
+              <a:rPr lang="nl-NL" dirty="0" err="1"/>
+              <a:t>empirical</a:t>
+            </a:r>
+            <a:r>
+              <a:rPr lang="nl-NL" dirty="0"/>
+              <a:t> </a:t>
+            </a:r>
+            <a:r>
+              <a:rPr lang="nl-NL" dirty="0" err="1"/>
+              <a:t>evaluation</a:t>
+            </a:r>
+            <a:endParaRPr lang="nl-NL" dirty="0"/>
+          </a:p>
+          <a:p>
+            <a:r>
+              <a:rPr lang="nl-NL" dirty="0"/>
+              <a:t>Start on feature </a:t>
+            </a:r>
+            <a:r>
+              <a:rPr lang="nl-NL" dirty="0" err="1"/>
+              <a:t>extraction</a:t>
+            </a:r>
+            <a:r>
+              <a:rPr lang="nl-NL" dirty="0"/>
+              <a:t> – </a:t>
+            </a:r>
+            <a:r>
+              <a:rPr lang="nl-NL" dirty="0" err="1"/>
+              <a:t>Use</a:t>
+            </a:r>
+            <a:r>
+              <a:rPr lang="nl-NL" dirty="0"/>
+              <a:t> </a:t>
+            </a:r>
+            <a:r>
+              <a:rPr lang="nl-NL" dirty="0" err="1"/>
+              <a:t>labeled</a:t>
+            </a:r>
+            <a:r>
+              <a:rPr lang="nl-NL" dirty="0"/>
+              <a:t> </a:t>
+            </a:r>
+            <a:r>
+              <a:rPr lang="nl-NL" dirty="0" err="1"/>
+              <a:t>characters</a:t>
+            </a:r>
+            <a:endParaRPr lang="nl-NL" dirty="0"/>
+          </a:p>
+          <a:p>
+            <a:endParaRPr lang="nl-NL" dirty="0"/>
           </a:p>
         </p:txBody>
       </p:sp>

</xml_diff>

<commit_message>
Small image processing, have questions about rotating the img
</commit_message>
<xml_diff>
--- a/Progress_update_1.pptx
+++ b/Progress_update_1.pptx
@@ -8097,11 +8097,11 @@
           <a:p>
             <a:r>
               <a:rPr lang="nl-NL" dirty="0"/>
-              <a:t>Programming </a:t>
+              <a:t>Data </a:t>
             </a:r>
             <a:r>
               <a:rPr lang="nl-NL" dirty="0" err="1"/>
-              <a:t>progress</a:t>
+              <a:t>exploration</a:t>
             </a:r>
             <a:endParaRPr lang="nl-NL" dirty="0"/>
           </a:p>
@@ -8887,7 +8887,7 @@
               <a:t> </a:t>
             </a:r>
             <a:r>
-              <a:rPr lang="nl-NL"/>
+              <a:rPr lang="nl-NL" dirty="0" err="1"/>
               <a:t>characters</a:t>
             </a:r>
             <a:endParaRPr lang="nl-NL" dirty="0"/>

</xml_diff>

<commit_message>
Added whitespace removal, rotating and resizing to pipeline
</commit_message>
<xml_diff>
--- a/Progress_update_1.pptx
+++ b/Progress_update_1.pptx
@@ -3928,7 +3928,7 @@
         <c:delete val="0"/>
         <c:axPos val="b"/>
         <c:numFmt formatCode="General" sourceLinked="1"/>
-        <c:majorTickMark val="none"/>
+        <c:majorTickMark val="out"/>
         <c:minorTickMark val="none"/>
         <c:tickLblPos val="nextTo"/>
         <c:spPr>
@@ -3965,7 +3965,7 @@
           </a:p>
         </c:txPr>
         <c:crossAx val="466087880"/>
-        <c:crosses val="autoZero"/>
+        <c:crossesAt val="0"/>
         <c:auto val="1"/>
         <c:lblAlgn val="ctr"/>
         <c:lblOffset val="100"/>
@@ -4747,7 +4747,7 @@
           <a:p>
             <a:fld id="{D1E6B4C4-F7C4-422E-A996-730FC91253EE}" type="datetimeFigureOut">
               <a:rPr lang="nl-NL" smtClean="0"/>
-              <a:t>10-5-2017</a:t>
+              <a:t>16-5-2017</a:t>
             </a:fld>
             <a:endParaRPr lang="nl-NL"/>
           </a:p>
@@ -4915,7 +4915,7 @@
           <a:p>
             <a:fld id="{D1E6B4C4-F7C4-422E-A996-730FC91253EE}" type="datetimeFigureOut">
               <a:rPr lang="nl-NL" smtClean="0"/>
-              <a:t>10-5-2017</a:t>
+              <a:t>16-5-2017</a:t>
             </a:fld>
             <a:endParaRPr lang="nl-NL"/>
           </a:p>
@@ -5093,7 +5093,7 @@
           <a:p>
             <a:fld id="{D1E6B4C4-F7C4-422E-A996-730FC91253EE}" type="datetimeFigureOut">
               <a:rPr lang="nl-NL" smtClean="0"/>
-              <a:t>10-5-2017</a:t>
+              <a:t>16-5-2017</a:t>
             </a:fld>
             <a:endParaRPr lang="nl-NL"/>
           </a:p>
@@ -5261,7 +5261,7 @@
           <a:p>
             <a:fld id="{D1E6B4C4-F7C4-422E-A996-730FC91253EE}" type="datetimeFigureOut">
               <a:rPr lang="nl-NL" smtClean="0"/>
-              <a:t>10-5-2017</a:t>
+              <a:t>16-5-2017</a:t>
             </a:fld>
             <a:endParaRPr lang="nl-NL"/>
           </a:p>
@@ -5506,7 +5506,7 @@
           <a:p>
             <a:fld id="{D1E6B4C4-F7C4-422E-A996-730FC91253EE}" type="datetimeFigureOut">
               <a:rPr lang="nl-NL" smtClean="0"/>
-              <a:t>10-5-2017</a:t>
+              <a:t>16-5-2017</a:t>
             </a:fld>
             <a:endParaRPr lang="nl-NL"/>
           </a:p>
@@ -5735,7 +5735,7 @@
           <a:p>
             <a:fld id="{D1E6B4C4-F7C4-422E-A996-730FC91253EE}" type="datetimeFigureOut">
               <a:rPr lang="nl-NL" smtClean="0"/>
-              <a:t>10-5-2017</a:t>
+              <a:t>16-5-2017</a:t>
             </a:fld>
             <a:endParaRPr lang="nl-NL"/>
           </a:p>
@@ -6099,7 +6099,7 @@
           <a:p>
             <a:fld id="{D1E6B4C4-F7C4-422E-A996-730FC91253EE}" type="datetimeFigureOut">
               <a:rPr lang="nl-NL" smtClean="0"/>
-              <a:t>10-5-2017</a:t>
+              <a:t>16-5-2017</a:t>
             </a:fld>
             <a:endParaRPr lang="nl-NL"/>
           </a:p>
@@ -6216,7 +6216,7 @@
           <a:p>
             <a:fld id="{D1E6B4C4-F7C4-422E-A996-730FC91253EE}" type="datetimeFigureOut">
               <a:rPr lang="nl-NL" smtClean="0"/>
-              <a:t>10-5-2017</a:t>
+              <a:t>16-5-2017</a:t>
             </a:fld>
             <a:endParaRPr lang="nl-NL"/>
           </a:p>
@@ -6311,7 +6311,7 @@
           <a:p>
             <a:fld id="{D1E6B4C4-F7C4-422E-A996-730FC91253EE}" type="datetimeFigureOut">
               <a:rPr lang="nl-NL" smtClean="0"/>
-              <a:t>10-5-2017</a:t>
+              <a:t>16-5-2017</a:t>
             </a:fld>
             <a:endParaRPr lang="nl-NL"/>
           </a:p>
@@ -6586,7 +6586,7 @@
           <a:p>
             <a:fld id="{D1E6B4C4-F7C4-422E-A996-730FC91253EE}" type="datetimeFigureOut">
               <a:rPr lang="nl-NL" smtClean="0"/>
-              <a:t>10-5-2017</a:t>
+              <a:t>16-5-2017</a:t>
             </a:fld>
             <a:endParaRPr lang="nl-NL"/>
           </a:p>
@@ -6838,7 +6838,7 @@
           <a:p>
             <a:fld id="{D1E6B4C4-F7C4-422E-A996-730FC91253EE}" type="datetimeFigureOut">
               <a:rPr lang="nl-NL" smtClean="0"/>
-              <a:t>10-5-2017</a:t>
+              <a:t>16-5-2017</a:t>
             </a:fld>
             <a:endParaRPr lang="nl-NL"/>
           </a:p>
@@ -7049,7 +7049,7 @@
           <a:p>
             <a:fld id="{D1E6B4C4-F7C4-422E-A996-730FC91253EE}" type="datetimeFigureOut">
               <a:rPr lang="nl-NL" smtClean="0"/>
-              <a:t>10-5-2017</a:t>
+              <a:t>16-5-2017</a:t>
             </a:fld>
             <a:endParaRPr lang="nl-NL"/>
           </a:p>
@@ -7480,7 +7480,7 @@
             </a:r>
             <a:r>
               <a:rPr lang="nl-NL" dirty="0"/>
-              <a:t> update 1</a:t>
+              <a:t> update 2</a:t>
             </a:r>
           </a:p>
         </p:txBody>
@@ -7874,7 +7874,78 @@
               <a:rPr lang="nl-NL" sz="1600" i="1" dirty="0"/>
               <a:t> Technology 6(7): 1283-1287, 2013</a:t>
             </a:r>
-            <a:endParaRPr lang="nl-NL" sz="1600" dirty="0"/>
+          </a:p>
+          <a:p>
+            <a:pPr marL="0" indent="0">
+              <a:buNone/>
+            </a:pPr>
+            <a:endParaRPr lang="nl-NL" sz="1600" b="1" dirty="0"/>
+          </a:p>
+          <a:p>
+            <a:pPr marL="0" indent="0">
+              <a:buNone/>
+            </a:pPr>
+            <a:r>
+              <a:rPr lang="nl-NL" sz="1600" b="1" dirty="0"/>
+              <a:t>Machine Learning</a:t>
+            </a:r>
+          </a:p>
+          <a:p>
+            <a:r>
+              <a:rPr lang="nl-NL" sz="1600" b="1" dirty="0"/>
+              <a:t>Zero-Shot Learning </a:t>
+            </a:r>
+            <a:r>
+              <a:rPr lang="nl-NL" sz="1600" b="1" dirty="0" err="1"/>
+              <a:t>Though</a:t>
+            </a:r>
+            <a:r>
+              <a:rPr lang="nl-NL" sz="1600" b="1" dirty="0"/>
+              <a:t> Cross-</a:t>
+            </a:r>
+            <a:r>
+              <a:rPr lang="nl-NL" sz="1600" b="1" dirty="0" err="1"/>
+              <a:t>Modal</a:t>
+            </a:r>
+            <a:r>
+              <a:rPr lang="nl-NL" sz="1600" b="1" dirty="0"/>
+              <a:t> transfer, </a:t>
+            </a:r>
+            <a:r>
+              <a:rPr lang="nl-NL" sz="1600" dirty="0" err="1"/>
+              <a:t>Socher</a:t>
+            </a:r>
+            <a:r>
+              <a:rPr lang="nl-NL" sz="1600" dirty="0"/>
+              <a:t>, R. </a:t>
+            </a:r>
+            <a:r>
+              <a:rPr lang="nl-NL" sz="1600" i="1" dirty="0"/>
+              <a:t>et al., Computing Research </a:t>
+            </a:r>
+            <a:r>
+              <a:rPr lang="nl-NL" sz="1600" i="1" dirty="0" err="1"/>
+              <a:t>Repository</a:t>
+            </a:r>
+            <a:r>
+              <a:rPr lang="nl-NL" sz="1600" i="1" dirty="0"/>
+              <a:t>, </a:t>
+            </a:r>
+            <a:r>
+              <a:rPr lang="nl-NL" sz="1600" dirty="0" err="1"/>
+              <a:t>abs</a:t>
+            </a:r>
+            <a:r>
+              <a:rPr lang="nl-NL" sz="1600" dirty="0"/>
+              <a:t>/1301,3666, Feb-2013</a:t>
+            </a:r>
+            <a:endParaRPr lang="nl-NL" sz="1600" b="1" dirty="0"/>
+          </a:p>
+          <a:p>
+            <a:pPr marL="0" indent="0">
+              <a:buNone/>
+            </a:pPr>
+            <a:endParaRPr lang="nl-NL" sz="1600" b="1" dirty="0"/>
           </a:p>
           <a:p>
             <a:endParaRPr lang="nl-NL" sz="1600" dirty="0"/>
@@ -8296,15 +8367,15 @@
             <a:pPr lvl="2"/>
             <a:r>
               <a:rPr lang="nl-NL" dirty="0" err="1"/>
-              <a:t>Convert</a:t>
-            </a:r>
-            <a:r>
-              <a:rPr lang="nl-NL" dirty="0"/>
-              <a:t> images </a:t>
-            </a:r>
+              <a:t>Rotation</a:t>
+            </a:r>
+            <a:endParaRPr lang="nl-NL" dirty="0"/>
+          </a:p>
+          <a:p>
+            <a:pPr lvl="2"/>
             <a:r>
               <a:rPr lang="nl-NL" dirty="0" err="1"/>
-              <a:t>to</a:t>
+              <a:t>To</a:t>
             </a:r>
             <a:r>
               <a:rPr lang="nl-NL" dirty="0"/>
@@ -8314,7 +8385,18 @@
               <a:rPr lang="nl-NL" dirty="0" err="1"/>
               <a:t>binary</a:t>
             </a:r>
-            <a:endParaRPr lang="nl-NL" dirty="0"/>
+            <a:r>
+              <a:rPr lang="nl-NL" dirty="0"/>
+              <a:t> (</a:t>
+            </a:r>
+            <a:r>
+              <a:rPr lang="nl-NL" dirty="0" err="1"/>
+              <a:t>otsu</a:t>
+            </a:r>
+            <a:r>
+              <a:rPr lang="nl-NL" dirty="0"/>
+              <a:t>)</a:t>
+            </a:r>
           </a:p>
           <a:p>
             <a:pPr lvl="2"/>
@@ -8409,15 +8491,7 @@
             </a:r>
             <a:r>
               <a:rPr lang="nl-NL" dirty="0"/>
-              <a:t> component overlap – </a:t>
-            </a:r>
-            <a:r>
-              <a:rPr lang="nl-NL" dirty="0" err="1"/>
-              <a:t>Improvements</a:t>
-            </a:r>
-            <a:r>
-              <a:rPr lang="nl-NL" dirty="0"/>
-              <a:t>?</a:t>
+              <a:t> component overlap</a:t>
             </a:r>
           </a:p>
           <a:p>
@@ -8508,7 +8582,7 @@
         </p:blipFill>
         <p:spPr>
           <a:xfrm>
-            <a:off x="4258096" y="4483359"/>
+            <a:off x="4744185" y="4969721"/>
             <a:ext cx="1974512" cy="1598049"/>
           </a:xfrm>
           <a:prstGeom prst="rect">
@@ -8532,7 +8606,7 @@
         </p:blipFill>
         <p:spPr>
           <a:xfrm>
-            <a:off x="1997168" y="4435581"/>
+            <a:off x="2342401" y="4969721"/>
             <a:ext cx="2060938" cy="1693604"/>
           </a:xfrm>
           <a:prstGeom prst="rect">
@@ -8640,9 +8714,16 @@
               <a:rPr lang="nl-NL" dirty="0"/>
               <a:t>: </a:t>
             </a:r>
+          </a:p>
+          <a:p>
+            <a:pPr lvl="1"/>
+            <a:r>
+              <a:rPr lang="nl-NL" dirty="0"/>
+              <a:t>Run </a:t>
+            </a:r>
             <a:r>
               <a:rPr lang="nl-NL" dirty="0" err="1"/>
-              <a:t>Threshold</a:t>
+              <a:t>count</a:t>
             </a:r>
             <a:r>
               <a:rPr lang="nl-NL" dirty="0"/>
@@ -8650,7 +8731,60 @@
             </a:r>
             <a:r>
               <a:rPr lang="nl-NL" dirty="0" err="1"/>
-              <a:t>optimization</a:t>
+              <a:t>for</a:t>
+            </a:r>
+            <a:r>
+              <a:rPr lang="nl-NL" dirty="0"/>
+              <a:t> feature </a:t>
+            </a:r>
+            <a:r>
+              <a:rPr lang="nl-NL" dirty="0" err="1"/>
+              <a:t>extraction</a:t>
+            </a:r>
+            <a:endParaRPr lang="nl-NL" dirty="0"/>
+          </a:p>
+          <a:p>
+            <a:endParaRPr lang="nl-NL" dirty="0"/>
+          </a:p>
+          <a:p>
+            <a:r>
+              <a:rPr lang="nl-NL" dirty="0" err="1"/>
+              <a:t>To</a:t>
+            </a:r>
+            <a:r>
+              <a:rPr lang="nl-NL" dirty="0"/>
+              <a:t> do:</a:t>
+            </a:r>
+          </a:p>
+          <a:p>
+            <a:pPr lvl="1"/>
+            <a:r>
+              <a:rPr lang="nl-NL" dirty="0" err="1"/>
+              <a:t>This</a:t>
+            </a:r>
+            <a:r>
+              <a:rPr lang="nl-NL" dirty="0"/>
+              <a:t> week: </a:t>
+            </a:r>
+            <a:r>
+              <a:rPr lang="nl-NL" dirty="0" err="1"/>
+              <a:t>classification</a:t>
+            </a:r>
+            <a:endParaRPr lang="nl-NL" dirty="0"/>
+          </a:p>
+          <a:p>
+            <a:pPr lvl="1"/>
+            <a:r>
+              <a:rPr lang="nl-NL" dirty="0" err="1"/>
+              <a:t>Possible</a:t>
+            </a:r>
+            <a:r>
+              <a:rPr lang="nl-NL" dirty="0"/>
+              <a:t>: </a:t>
+            </a:r>
+            <a:r>
+              <a:rPr lang="nl-NL" dirty="0" err="1"/>
+              <a:t>Segmentation</a:t>
             </a:r>
             <a:r>
               <a:rPr lang="nl-NL" dirty="0"/>
@@ -8658,41 +8792,24 @@
             </a:r>
             <a:r>
               <a:rPr lang="nl-NL" dirty="0" err="1"/>
-              <a:t>for</a:t>
-            </a:r>
+              <a:t>optimalization</a:t>
+            </a:r>
+            <a:endParaRPr lang="nl-NL" dirty="0"/>
+          </a:p>
+          <a:p>
+            <a:pPr lvl="1"/>
             <a:r>
               <a:rPr lang="nl-NL" dirty="0"/>
-              <a:t> </a:t>
+              <a:t>Method </a:t>
             </a:r>
             <a:r>
               <a:rPr lang="nl-NL" dirty="0" err="1"/>
-              <a:t>binarization</a:t>
+              <a:t>section</a:t>
             </a:r>
             <a:r>
               <a:rPr lang="nl-NL" dirty="0"/>
-              <a:t> </a:t>
-            </a:r>
-            <a:r>
-              <a:rPr lang="nl-NL" dirty="0" err="1"/>
-              <a:t>and</a:t>
-            </a:r>
-            <a:r>
-              <a:rPr lang="nl-NL" dirty="0"/>
-              <a:t> </a:t>
-            </a:r>
-            <a:r>
-              <a:rPr lang="nl-NL" dirty="0" err="1"/>
-              <a:t>noise</a:t>
-            </a:r>
-            <a:r>
-              <a:rPr lang="nl-NL" dirty="0"/>
-              <a:t> </a:t>
-            </a:r>
-            <a:r>
-              <a:rPr lang="nl-NL" dirty="0" err="1"/>
-              <a:t>removal</a:t>
-            </a:r>
-            <a:endParaRPr lang="nl-NL" dirty="0"/>
+              <a:t> report</a:t>
+            </a:r>
           </a:p>
         </p:txBody>
       </p:sp>
@@ -8784,13 +8901,16 @@
               <a:rPr lang="nl-NL" dirty="0" err="1"/>
               <a:t>done</a:t>
             </a:r>
+            <a:endParaRPr lang="nl-NL" dirty="0"/>
+          </a:p>
+          <a:p>
             <a:r>
               <a:rPr lang="nl-NL" dirty="0"/>
-              <a:t> – </a:t>
+              <a:t>First </a:t>
             </a:r>
             <a:r>
               <a:rPr lang="nl-NL" dirty="0" err="1"/>
-              <a:t>needs</a:t>
+              <a:t>segmentation</a:t>
             </a:r>
             <a:r>
               <a:rPr lang="nl-NL" dirty="0"/>
@@ -8798,7 +8918,7 @@
             </a:r>
             <a:r>
               <a:rPr lang="nl-NL" dirty="0" err="1"/>
-              <a:t>empirical</a:t>
+              <a:t>method</a:t>
             </a:r>
             <a:r>
               <a:rPr lang="nl-NL" dirty="0"/>
@@ -8806,7 +8926,7 @@
             </a:r>
             <a:r>
               <a:rPr lang="nl-NL" dirty="0" err="1"/>
-              <a:t>evaluation</a:t>
+              <a:t>done</a:t>
             </a:r>
             <a:endParaRPr lang="nl-NL" dirty="0"/>
           </a:p>

</xml_diff>